<commit_message>
tweaked slide deck (colors)
</commit_message>
<xml_diff>
--- a/media/quickpbt.pptx
+++ b/media/quickpbt.pptx
@@ -446,11 +446,11 @@
         </c:dLbls>
         <c:gapWidth val="80"/>
         <c:overlap val="40"/>
-        <c:axId val="-894257664"/>
-        <c:axId val="-932749072"/>
+        <c:axId val="1838639728"/>
+        <c:axId val="1838660240"/>
       </c:barChart>
       <c:catAx>
-        <c:axId val="-894257664"/>
+        <c:axId val="1838639728"/>
         <c:scaling>
           <c:orientation val="minMax"/>
         </c:scaling>
@@ -495,7 +495,7 @@
             <a:endParaRPr lang="en-US"/>
           </a:p>
         </c:txPr>
-        <c:crossAx val="-932749072"/>
+        <c:crossAx val="1838660240"/>
         <c:crosses val="autoZero"/>
         <c:auto val="0"/>
         <c:lblAlgn val="ctr"/>
@@ -504,7 +504,7 @@
         <c:noMultiLvlLbl val="0"/>
       </c:catAx>
       <c:valAx>
-        <c:axId val="-932749072"/>
+        <c:axId val="1838660240"/>
         <c:scaling>
           <c:orientation val="minMax"/>
         </c:scaling>
@@ -513,7 +513,7 @@
         <c:majorTickMark val="none"/>
         <c:minorTickMark val="none"/>
         <c:tickLblPos val="nextTo"/>
-        <c:crossAx val="-894257664"/>
+        <c:crossAx val="1838639728"/>
         <c:crosses val="autoZero"/>
         <c:crossBetween val="between"/>
       </c:valAx>
@@ -862,11 +862,11 @@
         </c:dLbls>
         <c:gapWidth val="80"/>
         <c:overlap val="40"/>
-        <c:axId val="-862105664"/>
-        <c:axId val="-862102912"/>
+        <c:axId val="1838782608"/>
+        <c:axId val="1838797968"/>
       </c:barChart>
       <c:catAx>
-        <c:axId val="-862105664"/>
+        <c:axId val="1838782608"/>
         <c:scaling>
           <c:orientation val="minMax"/>
         </c:scaling>
@@ -911,7 +911,7 @@
             <a:endParaRPr lang="en-US"/>
           </a:p>
         </c:txPr>
-        <c:crossAx val="-862102912"/>
+        <c:crossAx val="1838797968"/>
         <c:crosses val="autoZero"/>
         <c:auto val="0"/>
         <c:lblAlgn val="ctr"/>
@@ -920,7 +920,7 @@
         <c:noMultiLvlLbl val="0"/>
       </c:catAx>
       <c:valAx>
-        <c:axId val="-862102912"/>
+        <c:axId val="1838797968"/>
         <c:scaling>
           <c:orientation val="minMax"/>
         </c:scaling>
@@ -930,7 +930,7 @@
         <c:majorTickMark val="none"/>
         <c:minorTickMark val="none"/>
         <c:tickLblPos val="nextTo"/>
-        <c:crossAx val="-862105664"/>
+        <c:crossAx val="1838782608"/>
         <c:crosses val="autoZero"/>
         <c:crossBetween val="between"/>
       </c:valAx>
@@ -6384,7 +6384,7 @@
           <a:p>
             <a:fld id="{BED210CC-96DD-F14B-BC04-06F542233C3C}" type="datetimeFigureOut">
               <a:rPr lang="en-US" smtClean="0"/>
-              <a:t>9/19/17</a:t>
+              <a:t>9/21/17</a:t>
             </a:fld>
             <a:endParaRPr lang="en-US"/>
           </a:p>
@@ -8731,12 +8731,20 @@
               <a:buChar char="•"/>
             </a:pPr>
             <a:r>
-              <a:rPr lang="en-US" sz="1200" dirty="0" smtClean="0"/>
-              <a:t>Expecting exceptions – INCLUDED</a:t>
+              <a:rPr lang="en-US" sz="1200" smtClean="0"/>
+              <a:t>Expecting </a:t>
+            </a:r>
+            <a:r>
+              <a:rPr lang="en-US" sz="1200" smtClean="0"/>
+              <a:t>exceptions</a:t>
+            </a:r>
+            <a:r>
+              <a:rPr lang="en-US" sz="1200" baseline="0" smtClean="0"/>
+              <a:t> </a:t>
             </a:r>
             <a:r>
               <a:rPr lang="en-US" sz="1200" baseline="0" dirty="0" smtClean="0"/>
-              <a:t> IN SAMPLES (F# only!)</a:t>
+              <a:t>(F# only!)</a:t>
             </a:r>
             <a:endParaRPr lang="en-US" sz="1200" dirty="0" smtClean="0"/>
           </a:p>
@@ -14344,15 +14352,7 @@
                 <a:ea typeface="Courier" charset="0"/>
                 <a:cs typeface="Courier" charset="0"/>
               </a:rPr>
-              <a:t> ``trivial daylight savings support`` </a:t>
-            </a:r>
-            <a:r>
-              <a:rPr lang="en-US" sz="1200" dirty="0" smtClean="0">
-                <a:latin typeface="Courier" charset="0"/>
-                <a:ea typeface="Courier" charset="0"/>
-                <a:cs typeface="Courier" charset="0"/>
-              </a:rPr>
-              <a:t>(</a:t>
+              <a:t> ``trivial daylight savings support`` (</a:t>
             </a:r>
             <a:r>
               <a:rPr lang="en-US" sz="1200" dirty="0" err="1" smtClean="0">
@@ -14368,15 +14368,7 @@
                 <a:ea typeface="Courier" charset="0"/>
                 <a:cs typeface="Courier" charset="0"/>
               </a:rPr>
-              <a:t> :Date) </a:t>
-            </a:r>
-            <a:r>
-              <a:rPr lang="en-US" sz="1200" dirty="0" smtClean="0">
-                <a:latin typeface="Courier" charset="0"/>
-                <a:ea typeface="Courier" charset="0"/>
-                <a:cs typeface="Courier" charset="0"/>
-              </a:rPr>
-              <a:t>(</a:t>
+              <a:t> :Date) (</a:t>
             </a:r>
             <a:r>
               <a:rPr lang="en-US" sz="1200" dirty="0" err="1" smtClean="0">
@@ -14392,15 +14384,7 @@
                 <a:ea typeface="Courier" charset="0"/>
                 <a:cs typeface="Courier" charset="0"/>
               </a:rPr>
-              <a:t> :Zone</a:t>
-            </a:r>
-            <a:r>
-              <a:rPr lang="en-US" sz="1200" dirty="0" smtClean="0">
-                <a:latin typeface="Courier" charset="0"/>
-                <a:ea typeface="Courier" charset="0"/>
-                <a:cs typeface="Courier" charset="0"/>
-              </a:rPr>
-              <a:t>) (</a:t>
+              <a:t> :Zone) (</a:t>
             </a:r>
             <a:r>
               <a:rPr lang="en-US" sz="1200" dirty="0" err="1" smtClean="0">
@@ -14416,15 +14400,7 @@
                 <a:ea typeface="Courier" charset="0"/>
                 <a:cs typeface="Courier" charset="0"/>
               </a:rPr>
-              <a:t> total) </a:t>
-            </a:r>
-            <a:r>
-              <a:rPr lang="en-US" sz="1200" dirty="0" smtClean="0">
-                <a:latin typeface="Courier" charset="0"/>
-                <a:ea typeface="Courier" charset="0"/>
-                <a:cs typeface="Courier" charset="0"/>
-              </a:rPr>
-              <a:t>=</a:t>
+              <a:t> total) =</a:t>
             </a:r>
           </a:p>
           <a:p>
@@ -15604,15 +15580,7 @@
                 <a:ea typeface="Courier" charset="0"/>
                 <a:cs typeface="Courier" charset="0"/>
               </a:rPr>
-              <a:t> </a:t>
-            </a:r>
-            <a:r>
-              <a:rPr lang="en-US" sz="1200" dirty="0" smtClean="0">
-                <a:latin typeface="Courier" charset="0"/>
-                <a:ea typeface="Courier" charset="0"/>
-                <a:cs typeface="Courier" charset="0"/>
-              </a:rPr>
-              <a:t>Dated, </a:t>
+              <a:t> Dated, </a:t>
             </a:r>
             <a:r>
               <a:rPr lang="en-US" sz="1200" dirty="0" err="1" smtClean="0">
@@ -15738,14 +15706,6 @@
               </a:rPr>
               <a:t>  </a:t>
             </a:r>
-            <a:endParaRPr lang="en-US" sz="1200" dirty="0" smtClean="0">
-              <a:solidFill>
-                <a:srgbClr val="0000FF"/>
-              </a:solidFill>
-              <a:latin typeface="Courier" charset="0"/>
-              <a:ea typeface="Courier" charset="0"/>
-              <a:cs typeface="Courier" charset="0"/>
-            </a:endParaRPr>
           </a:p>
           <a:p>
             <a:pPr marL="0" indent="0">
@@ -15774,18 +15734,7 @@
                 <a:ea typeface="Courier" charset="0"/>
                 <a:cs typeface="Courier" charset="0"/>
               </a:rPr>
-              <a:t> </a:t>
-            </a:r>
-            <a:r>
-              <a:rPr lang="en-US" sz="1200" dirty="0" smtClean="0">
-                <a:solidFill>
-                  <a:srgbClr val="0000FF"/>
-                </a:solidFill>
-                <a:latin typeface="Courier" charset="0"/>
-                <a:ea typeface="Courier" charset="0"/>
-                <a:cs typeface="Courier" charset="0"/>
-              </a:rPr>
-              <a:t>Dim </a:t>
+              <a:t> Dim </a:t>
             </a:r>
             <a:r>
               <a:rPr lang="en-US" sz="1200" dirty="0" smtClean="0">
@@ -16048,14 +15997,6 @@
               </a:rPr>
               <a:t> </a:t>
             </a:r>
-            <a:endParaRPr lang="en-US" sz="1200" dirty="0" smtClean="0">
-              <a:solidFill>
-                <a:srgbClr val="0000FF"/>
-              </a:solidFill>
-              <a:latin typeface="Courier" charset="0"/>
-              <a:ea typeface="Courier" charset="0"/>
-              <a:cs typeface="Courier" charset="0"/>
-            </a:endParaRPr>
           </a:p>
           <a:p>
             <a:pPr marL="0" indent="0">
@@ -16084,18 +16025,7 @@
                 <a:ea typeface="Courier" charset="0"/>
                 <a:cs typeface="Courier" charset="0"/>
               </a:rPr>
-              <a:t> </a:t>
-            </a:r>
-            <a:r>
-              <a:rPr lang="en-US" sz="1200" dirty="0" smtClean="0">
-                <a:solidFill>
-                  <a:srgbClr val="0000FF"/>
-                </a:solidFill>
-                <a:latin typeface="Courier" charset="0"/>
-                <a:ea typeface="Courier" charset="0"/>
-                <a:cs typeface="Courier" charset="0"/>
-              </a:rPr>
-              <a:t>Return </a:t>
+              <a:t> Return </a:t>
             </a:r>
             <a:r>
               <a:rPr lang="en-US" sz="1200" dirty="0" smtClean="0">
@@ -17254,15 +17184,7 @@
                 <a:ea typeface="Courier" charset="0"/>
                 <a:cs typeface="Courier" charset="0"/>
               </a:rPr>
-              <a:t>, </a:t>
-            </a:r>
-            <a:r>
-              <a:rPr lang="en-US" sz="1200" dirty="0" smtClean="0">
-                <a:latin typeface="Courier" charset="0"/>
-                <a:ea typeface="Courier" charset="0"/>
-                <a:cs typeface="Courier" charset="0"/>
-              </a:rPr>
-              <a:t>Zone </a:t>
+              <a:t>, Zone </a:t>
             </a:r>
             <a:r>
               <a:rPr lang="en-US" sz="1200" dirty="0" err="1" smtClean="0">
@@ -17312,11 +17234,6 @@
               </a:rPr>
               <a:t>{</a:t>
             </a:r>
-            <a:endParaRPr lang="en-US" sz="1200" dirty="0" smtClean="0">
-              <a:latin typeface="Courier" charset="0"/>
-              <a:ea typeface="Courier" charset="0"/>
-              <a:cs typeface="Courier" charset="0"/>
-            </a:endParaRPr>
           </a:p>
           <a:p>
             <a:pPr marL="0" indent="0">
@@ -17608,15 +17525,7 @@
                 <a:ea typeface="Courier" charset="0"/>
                 <a:cs typeface="Courier" charset="0"/>
               </a:rPr>
-              <a:t>) + days</a:t>
-            </a:r>
-            <a:r>
-              <a:rPr lang="en-US" sz="1200" dirty="0" smtClean="0">
-                <a:latin typeface="Courier" charset="0"/>
-                <a:ea typeface="Courier" charset="0"/>
-                <a:cs typeface="Courier" charset="0"/>
-              </a:rPr>
-              <a:t>;</a:t>
+              <a:t>) + days;</a:t>
             </a:r>
           </a:p>
           <a:p>
@@ -18574,15 +18483,7 @@
                 <a:ea typeface="Courier" charset="0"/>
                 <a:cs typeface="Courier" charset="0"/>
               </a:rPr>
-              <a:t> ``many observations combined`` </a:t>
-            </a:r>
-            <a:r>
-              <a:rPr lang="en-US" sz="1200" dirty="0" smtClean="0">
-                <a:latin typeface="Courier" charset="0"/>
-                <a:ea typeface="Courier" charset="0"/>
-                <a:cs typeface="Courier" charset="0"/>
-              </a:rPr>
-              <a:t>(</a:t>
+              <a:t> ``many observations combined`` (</a:t>
             </a:r>
             <a:r>
               <a:rPr lang="en-US" sz="1200" dirty="0" err="1" smtClean="0">
@@ -18598,15 +18499,7 @@
                 <a:ea typeface="Courier" charset="0"/>
                 <a:cs typeface="Courier" charset="0"/>
               </a:rPr>
-              <a:t> :Date) </a:t>
-            </a:r>
-            <a:r>
-              <a:rPr lang="en-US" sz="1200" dirty="0" smtClean="0">
-                <a:latin typeface="Courier" charset="0"/>
-                <a:ea typeface="Courier" charset="0"/>
-                <a:cs typeface="Courier" charset="0"/>
-              </a:rPr>
-              <a:t>(</a:t>
+              <a:t> :Date) (</a:t>
             </a:r>
             <a:r>
               <a:rPr lang="en-US" sz="1200" dirty="0" err="1" smtClean="0">
@@ -18622,15 +18515,7 @@
                 <a:ea typeface="Courier" charset="0"/>
                 <a:cs typeface="Courier" charset="0"/>
               </a:rPr>
-              <a:t> :Zone</a:t>
-            </a:r>
-            <a:r>
-              <a:rPr lang="en-US" sz="1200" dirty="0" smtClean="0">
-                <a:latin typeface="Courier" charset="0"/>
-                <a:ea typeface="Courier" charset="0"/>
-                <a:cs typeface="Courier" charset="0"/>
-              </a:rPr>
-              <a:t>) (</a:t>
+              <a:t> :Zone) (</a:t>
             </a:r>
             <a:r>
               <a:rPr lang="en-US" sz="1200" dirty="0" err="1" smtClean="0">
@@ -18646,15 +18531,7 @@
                 <a:ea typeface="Courier" charset="0"/>
                 <a:cs typeface="Courier" charset="0"/>
               </a:rPr>
-              <a:t> total) </a:t>
-            </a:r>
-            <a:r>
-              <a:rPr lang="en-US" sz="1200" dirty="0" smtClean="0">
-                <a:latin typeface="Courier" charset="0"/>
-                <a:ea typeface="Courier" charset="0"/>
-                <a:cs typeface="Courier" charset="0"/>
-              </a:rPr>
-              <a:t>=</a:t>
+              <a:t> total) =</a:t>
             </a:r>
           </a:p>
           <a:p>
@@ -22971,7 +22848,18 @@
                 <a:ea typeface="Courier" charset="0"/>
                 <a:cs typeface="Courier" charset="0"/>
               </a:rPr>
-              <a:t>// instead of a conditional property, here we use a </a:t>
+              <a:t>// instead of a conditional property, here we use </a:t>
+            </a:r>
+            <a:r>
+              <a:rPr lang="en-US" sz="1200" dirty="0" smtClean="0">
+                <a:solidFill>
+                  <a:srgbClr val="008000"/>
+                </a:solidFill>
+                <a:latin typeface="Courier" charset="0"/>
+                <a:ea typeface="Courier" charset="0"/>
+                <a:cs typeface="Courier" charset="0"/>
+              </a:rPr>
+              <a:t>an </a:t>
             </a:r>
             <a:r>
               <a:rPr lang="en-US" sz="1200" dirty="0" err="1" smtClean="0">
@@ -23004,7 +22892,7 @@
               <a:buNone/>
             </a:pPr>
             <a:r>
-              <a:rPr lang="en-US" sz="1200" dirty="0" smtClean="0">
+              <a:rPr lang="en-US" sz="1200" dirty="0">
                 <a:solidFill>
                   <a:srgbClr val="0000FF"/>
                 </a:solidFill>
@@ -23012,15 +22900,45 @@
                 <a:ea typeface="Courier" charset="0"/>
                 <a:cs typeface="Courier" charset="0"/>
               </a:rPr>
-              <a:t>let </a:t>
-            </a:r>
-            <a:r>
-              <a:rPr lang="en-US" sz="1200" dirty="0" smtClean="0">
-                <a:latin typeface="Courier" charset="0"/>
-                <a:ea typeface="Courier" charset="0"/>
-                <a:cs typeface="Courier" charset="0"/>
-              </a:rPr>
-              <a:t>``zone is unchanged through round-trip serialization`` () =</a:t>
+              <a:t>public </a:t>
+            </a:r>
+            <a:r>
+              <a:rPr lang="en-US" sz="1200" dirty="0">
+                <a:solidFill>
+                  <a:srgbClr val="408080"/>
+                </a:solidFill>
+                <a:latin typeface="Courier" charset="0"/>
+                <a:ea typeface="Courier" charset="0"/>
+                <a:cs typeface="Courier" charset="0"/>
+              </a:rPr>
+              <a:t>Property</a:t>
+            </a:r>
+            <a:r>
+              <a:rPr lang="en-US" sz="1200" dirty="0">
+                <a:solidFill>
+                  <a:srgbClr val="0000FF"/>
+                </a:solidFill>
+                <a:latin typeface="Courier" charset="0"/>
+                <a:ea typeface="Courier" charset="0"/>
+                <a:cs typeface="Courier" charset="0"/>
+              </a:rPr>
+              <a:t> </a:t>
+            </a:r>
+            <a:r>
+              <a:rPr lang="en-US" sz="1200" dirty="0" err="1">
+                <a:latin typeface="Courier" charset="0"/>
+                <a:ea typeface="Courier" charset="0"/>
+                <a:cs typeface="Courier" charset="0"/>
+              </a:rPr>
+              <a:t>zone_is_unchanged_through_round_trip_serialization</a:t>
+            </a:r>
+            <a:r>
+              <a:rPr lang="en-US" sz="1200" dirty="0" smtClean="0">
+                <a:latin typeface="Courier" charset="0"/>
+                <a:ea typeface="Courier" charset="0"/>
+                <a:cs typeface="Courier" charset="0"/>
+              </a:rPr>
+              <a:t>()</a:t>
             </a:r>
           </a:p>
           <a:p>
@@ -23031,10 +22949,30 @@
               <a:buNone/>
             </a:pPr>
             <a:r>
+              <a:rPr lang="en-US" sz="1200" dirty="0" smtClean="0">
+                <a:latin typeface="Courier" charset="0"/>
+                <a:ea typeface="Courier" charset="0"/>
+                <a:cs typeface="Courier" charset="0"/>
+              </a:rPr>
+              <a:t>{</a:t>
+            </a:r>
+            <a:r>
               <a:rPr lang="en-US" sz="1200" dirty="0">
-                <a:solidFill>
-                  <a:srgbClr val="0000FF"/>
-                </a:solidFill>
+                <a:latin typeface="Courier" charset="0"/>
+                <a:ea typeface="Courier" charset="0"/>
+                <a:cs typeface="Courier" charset="0"/>
+              </a:rPr>
+              <a:t/>
+            </a:r>
+            <a:br>
+              <a:rPr lang="en-US" sz="1200" dirty="0">
+                <a:latin typeface="Courier" charset="0"/>
+                <a:ea typeface="Courier" charset="0"/>
+                <a:cs typeface="Courier" charset="0"/>
+              </a:rPr>
+            </a:br>
+            <a:r>
+              <a:rPr lang="en-US" sz="1200" dirty="0" smtClean="0">
                 <a:latin typeface="Courier" charset="0"/>
                 <a:ea typeface="Courier" charset="0"/>
                 <a:cs typeface="Courier" charset="0"/>
@@ -23153,7 +23091,15 @@
                 <a:ea typeface="Courier" charset="0"/>
                 <a:cs typeface="Courier" charset="0"/>
               </a:rPr>
-              <a:t> {</a:t>
+              <a:t> </a:t>
+            </a:r>
+            <a:r>
+              <a:rPr lang="en-US" sz="1200" dirty="0" smtClean="0">
+                <a:latin typeface="Courier" charset="0"/>
+                <a:ea typeface="Courier" charset="0"/>
+                <a:cs typeface="Courier" charset="0"/>
+              </a:rPr>
+              <a:t>{</a:t>
             </a:r>
           </a:p>
           <a:p>
@@ -23188,13 +23134,51 @@
             <a:r>
               <a:rPr lang="en-US" sz="1200" dirty="0" err="1" smtClean="0">
                 <a:solidFill>
+                  <a:srgbClr val="0000FF"/>
+                </a:solidFill>
+                <a:latin typeface="Courier" charset="0"/>
+                <a:ea typeface="Courier" charset="0"/>
+                <a:cs typeface="Courier" charset="0"/>
+              </a:rPr>
+              <a:t>var</a:t>
+            </a:r>
+            <a:r>
+              <a:rPr lang="en-US" sz="1200" dirty="0" smtClean="0">
+                <a:solidFill>
+                  <a:srgbClr val="0000FF"/>
+                </a:solidFill>
+                <a:latin typeface="Courier" charset="0"/>
+                <a:ea typeface="Courier" charset="0"/>
+                <a:cs typeface="Courier" charset="0"/>
+              </a:rPr>
+              <a:t> </a:t>
+            </a:r>
+            <a:r>
+              <a:rPr lang="en-US" sz="1200" dirty="0" smtClean="0">
+                <a:latin typeface="Courier" charset="0"/>
+                <a:ea typeface="Courier" charset="0"/>
+                <a:cs typeface="Courier" charset="0"/>
+              </a:rPr>
+              <a:t>deflated</a:t>
+            </a:r>
+            <a:r>
+              <a:rPr lang="en-US" sz="1200" dirty="0" smtClean="0">
+                <a:solidFill>
                   <a:srgbClr val="408080"/>
                 </a:solidFill>
                 <a:latin typeface="Courier" charset="0"/>
                 <a:ea typeface="Courier" charset="0"/>
                 <a:cs typeface="Courier" charset="0"/>
               </a:rPr>
-              <a:t>var</a:t>
+              <a:t> </a:t>
+            </a:r>
+            <a:r>
+              <a:rPr lang="en-US" sz="1200" dirty="0" smtClean="0">
+                <a:latin typeface="Courier" charset="0"/>
+                <a:ea typeface="Courier" charset="0"/>
+                <a:cs typeface="Courier" charset="0"/>
+              </a:rPr>
+              <a:t>=</a:t>
             </a:r>
             <a:r>
               <a:rPr lang="en-US" sz="1200" dirty="0" smtClean="0">
@@ -23205,7 +23189,7 @@
                 <a:ea typeface="Courier" charset="0"/>
                 <a:cs typeface="Courier" charset="0"/>
               </a:rPr>
-              <a:t> deflated = </a:t>
+              <a:t> </a:t>
             </a:r>
             <a:r>
               <a:rPr lang="en-US" sz="1200" dirty="0" err="1">
@@ -23256,13 +23240,51 @@
             <a:r>
               <a:rPr lang="en-US" sz="1200" dirty="0" err="1" smtClean="0">
                 <a:solidFill>
+                  <a:srgbClr val="0000FF"/>
+                </a:solidFill>
+                <a:latin typeface="Courier" charset="0"/>
+                <a:ea typeface="Courier" charset="0"/>
+                <a:cs typeface="Courier" charset="0"/>
+              </a:rPr>
+              <a:t>var</a:t>
+            </a:r>
+            <a:r>
+              <a:rPr lang="en-US" sz="1200" dirty="0" smtClean="0">
+                <a:solidFill>
+                  <a:srgbClr val="0000FF"/>
+                </a:solidFill>
+                <a:latin typeface="Courier" charset="0"/>
+                <a:ea typeface="Courier" charset="0"/>
+                <a:cs typeface="Courier" charset="0"/>
+              </a:rPr>
+              <a:t> </a:t>
+            </a:r>
+            <a:r>
+              <a:rPr lang="en-US" sz="1200" dirty="0" smtClean="0">
+                <a:latin typeface="Courier" charset="0"/>
+                <a:ea typeface="Courier" charset="0"/>
+                <a:cs typeface="Courier" charset="0"/>
+              </a:rPr>
+              <a:t>inflated</a:t>
+            </a:r>
+            <a:r>
+              <a:rPr lang="en-US" sz="1200" dirty="0" smtClean="0">
+                <a:solidFill>
                   <a:srgbClr val="408080"/>
                 </a:solidFill>
                 <a:latin typeface="Courier" charset="0"/>
                 <a:ea typeface="Courier" charset="0"/>
                 <a:cs typeface="Courier" charset="0"/>
               </a:rPr>
-              <a:t>var</a:t>
+              <a:t> </a:t>
+            </a:r>
+            <a:r>
+              <a:rPr lang="en-US" sz="1200" dirty="0" smtClean="0">
+                <a:latin typeface="Courier" charset="0"/>
+                <a:ea typeface="Courier" charset="0"/>
+                <a:cs typeface="Courier" charset="0"/>
+              </a:rPr>
+              <a:t>=</a:t>
             </a:r>
             <a:r>
               <a:rPr lang="en-US" sz="1200" dirty="0" smtClean="0">
@@ -23273,7 +23295,7 @@
                 <a:ea typeface="Courier" charset="0"/>
                 <a:cs typeface="Courier" charset="0"/>
               </a:rPr>
-              <a:t> inflated = </a:t>
+              <a:t> </a:t>
             </a:r>
             <a:r>
               <a:rPr lang="en-US" sz="1200" dirty="0" err="1" smtClean="0">
@@ -23324,7 +23346,26 @@
                 <a:ea typeface="Courier" charset="0"/>
                 <a:cs typeface="Courier" charset="0"/>
               </a:rPr>
-              <a:t>   return </a:t>
+              <a:t>   </a:t>
+            </a:r>
+            <a:r>
+              <a:rPr lang="en-US" sz="1200" dirty="0" smtClean="0">
+                <a:solidFill>
+                  <a:srgbClr val="0000FF"/>
+                </a:solidFill>
+                <a:latin typeface="Courier" charset="0"/>
+                <a:ea typeface="Courier" charset="0"/>
+                <a:cs typeface="Courier" charset="0"/>
+              </a:rPr>
+              <a:t>return</a:t>
+            </a:r>
+            <a:r>
+              <a:rPr lang="en-US" sz="1200" dirty="0" smtClean="0">
+                <a:latin typeface="Courier" charset="0"/>
+                <a:ea typeface="Courier" charset="0"/>
+                <a:cs typeface="Courier" charset="0"/>
+              </a:rPr>
+              <a:t> </a:t>
             </a:r>
             <a:r>
               <a:rPr lang="en-US" sz="1200" dirty="0" err="1" smtClean="0">
@@ -23332,15 +23373,7 @@
                 <a:ea typeface="Courier" charset="0"/>
                 <a:cs typeface="Courier" charset="0"/>
               </a:rPr>
-              <a:t>inflated.</a:t>
-            </a:r>
-            <a:r>
-              <a:rPr lang="en-US" sz="1200" dirty="0" err="1" smtClean="0">
-                <a:latin typeface="Courier" charset="0"/>
-                <a:ea typeface="Courier" charset="0"/>
-                <a:cs typeface="Courier" charset="0"/>
-              </a:rPr>
-              <a:t>Equals</a:t>
+              <a:t>inflated.Equals</a:t>
             </a:r>
             <a:r>
               <a:rPr lang="en-US" sz="1200" dirty="0" smtClean="0">
@@ -23383,8 +23416,21 @@
                 <a:ea typeface="Courier" charset="0"/>
                 <a:cs typeface="Courier" charset="0"/>
               </a:rPr>
-              <a:t>  }</a:t>
-            </a:r>
+              <a:t>  </a:t>
+            </a:r>
+            <a:r>
+              <a:rPr lang="en-US" sz="1200" dirty="0" smtClean="0">
+                <a:latin typeface="Courier" charset="0"/>
+                <a:ea typeface="Courier" charset="0"/>
+                <a:cs typeface="Courier" charset="0"/>
+              </a:rPr>
+              <a:t>}</a:t>
+            </a:r>
+            <a:endParaRPr lang="en-US" sz="1200" dirty="0" smtClean="0">
+              <a:latin typeface="Courier" charset="0"/>
+              <a:ea typeface="Courier" charset="0"/>
+              <a:cs typeface="Courier" charset="0"/>
+            </a:endParaRPr>
           </a:p>
           <a:p>
             <a:pPr marL="0" indent="0">
@@ -23393,6 +23439,17 @@
               </a:lnSpc>
               <a:buNone/>
             </a:pPr>
+            <a:r>
+              <a:rPr lang="en-US" sz="1200" dirty="0" smtClean="0">
+                <a:solidFill>
+                  <a:srgbClr val="0000FF"/>
+                </a:solidFill>
+                <a:latin typeface="Courier" charset="0"/>
+                <a:ea typeface="Courier" charset="0"/>
+                <a:cs typeface="Courier" charset="0"/>
+              </a:rPr>
+              <a:t> </a:t>
+            </a:r>
             <a:endParaRPr lang="en-US" sz="1200" dirty="0" smtClean="0">
               <a:solidFill>
                 <a:srgbClr val="0000FF"/>
@@ -23418,7 +23475,7 @@
                 <a:ea typeface="Courier" charset="0"/>
                 <a:cs typeface="Courier" charset="0"/>
               </a:rPr>
-              <a:t>  </a:t>
+              <a:t> </a:t>
             </a:r>
             <a:r>
               <a:rPr lang="en-US" sz="1200" dirty="0" smtClean="0">
@@ -23513,7 +23570,45 @@
                 <a:ea typeface="Courier" charset="0"/>
                 <a:cs typeface="Courier" charset="0"/>
               </a:rPr>
-              <a:t>(from z in </a:t>
+              <a:t>(</a:t>
+            </a:r>
+            <a:r>
+              <a:rPr lang="en-US" sz="1200" dirty="0">
+                <a:solidFill>
+                  <a:srgbClr val="0000FF"/>
+                </a:solidFill>
+                <a:latin typeface="Courier" charset="0"/>
+                <a:ea typeface="Courier" charset="0"/>
+                <a:cs typeface="Courier" charset="0"/>
+              </a:rPr>
+              <a:t>from</a:t>
+            </a:r>
+            <a:r>
+              <a:rPr lang="en-US" sz="1200" dirty="0">
+                <a:latin typeface="Courier" charset="0"/>
+                <a:ea typeface="Courier" charset="0"/>
+                <a:cs typeface="Courier" charset="0"/>
+              </a:rPr>
+              <a:t> z </a:t>
+            </a:r>
+            <a:r>
+              <a:rPr lang="en-US" sz="1200" dirty="0">
+                <a:solidFill>
+                  <a:srgbClr val="0000FF"/>
+                </a:solidFill>
+                <a:latin typeface="Courier" charset="0"/>
+                <a:ea typeface="Courier" charset="0"/>
+                <a:cs typeface="Courier" charset="0"/>
+              </a:rPr>
+              <a:t>in</a:t>
+            </a:r>
+            <a:r>
+              <a:rPr lang="en-US" sz="1200" dirty="0">
+                <a:latin typeface="Courier" charset="0"/>
+                <a:ea typeface="Courier" charset="0"/>
+                <a:cs typeface="Courier" charset="0"/>
+              </a:rPr>
+              <a:t> </a:t>
             </a:r>
             <a:r>
               <a:rPr lang="en-US" sz="1200" dirty="0" err="1">
@@ -23540,7 +23635,26 @@
                 <a:ea typeface="Courier" charset="0"/>
                 <a:cs typeface="Courier" charset="0"/>
               </a:rPr>
-              <a:t>() select z).</a:t>
+              <a:t>() </a:t>
+            </a:r>
+            <a:r>
+              <a:rPr lang="en-US" sz="1200" dirty="0">
+                <a:solidFill>
+                  <a:srgbClr val="0000FF"/>
+                </a:solidFill>
+                <a:latin typeface="Courier" charset="0"/>
+                <a:ea typeface="Courier" charset="0"/>
+                <a:cs typeface="Courier" charset="0"/>
+              </a:rPr>
+              <a:t>select</a:t>
+            </a:r>
+            <a:r>
+              <a:rPr lang="en-US" sz="1200" dirty="0">
+                <a:latin typeface="Courier" charset="0"/>
+                <a:ea typeface="Courier" charset="0"/>
+                <a:cs typeface="Courier" charset="0"/>
+              </a:rPr>
+              <a:t> z).</a:t>
             </a:r>
             <a:r>
               <a:rPr lang="en-US" sz="1200" dirty="0" err="1">
@@ -23575,7 +23689,7 @@
               <a:buNone/>
             </a:pPr>
             <a:r>
-              <a:rPr lang="en-US" sz="1200" dirty="0" smtClean="0">
+              <a:rPr lang="en-US" sz="1200" dirty="0">
                 <a:solidFill>
                   <a:srgbClr val="0000FF"/>
                 </a:solidFill>
@@ -23583,18 +23697,10 @@
                 <a:ea typeface="Courier" charset="0"/>
                 <a:cs typeface="Courier" charset="0"/>
               </a:rPr>
-              <a:t>  </a:t>
-            </a:r>
-          </a:p>
-          <a:p>
-            <a:pPr marL="0" indent="0">
-              <a:lnSpc>
-                <a:spcPct val="100000"/>
-              </a:lnSpc>
-              <a:buNone/>
-            </a:pPr>
-            <a:r>
-              <a:rPr lang="en-US" sz="1200" dirty="0">
+              <a:t> </a:t>
+            </a:r>
+            <a:r>
+              <a:rPr lang="en-US" sz="1200" dirty="0" smtClean="0">
                 <a:solidFill>
                   <a:srgbClr val="0000FF"/>
                 </a:solidFill>
@@ -23607,35 +23713,13 @@
             <a:r>
               <a:rPr lang="en-US" sz="1200" dirty="0" smtClean="0">
                 <a:solidFill>
-                  <a:srgbClr val="0000FF"/>
-                </a:solidFill>
-                <a:latin typeface="Courier" charset="0"/>
-                <a:ea typeface="Courier" charset="0"/>
-                <a:cs typeface="Courier" charset="0"/>
-              </a:rPr>
-              <a:t> </a:t>
-            </a:r>
-            <a:r>
-              <a:rPr lang="en-US" sz="1200" dirty="0" smtClean="0">
-                <a:solidFill>
                   <a:srgbClr val="008000"/>
                 </a:solidFill>
                 <a:latin typeface="Courier" charset="0"/>
                 <a:ea typeface="Courier" charset="0"/>
                 <a:cs typeface="Courier" charset="0"/>
               </a:rPr>
-              <a:t>// </a:t>
-            </a:r>
-            <a:r>
-              <a:rPr lang="en-US" sz="1200" dirty="0" smtClean="0">
-                <a:solidFill>
-                  <a:srgbClr val="008000"/>
-                </a:solidFill>
-                <a:latin typeface="Courier" charset="0"/>
-                <a:ea typeface="Courier" charset="0"/>
-                <a:cs typeface="Courier" charset="0"/>
-              </a:rPr>
-              <a:t>"for all" zones, run a test...</a:t>
+              <a:t>// "for all" zones, run a test...</a:t>
             </a:r>
             <a:endParaRPr lang="en-US" sz="1200" dirty="0" smtClean="0">
               <a:solidFill>
@@ -23677,11 +23761,22 @@
             </a:r>
             <a:r>
               <a:rPr lang="en-US" sz="1200" dirty="0">
-                <a:latin typeface="Courier" charset="0"/>
-                <a:ea typeface="Courier" charset="0"/>
-                <a:cs typeface="Courier" charset="0"/>
-              </a:rPr>
-              <a:t>return </a:t>
+                <a:solidFill>
+                  <a:srgbClr val="0000FF"/>
+                </a:solidFill>
+                <a:latin typeface="Courier" charset="0"/>
+                <a:ea typeface="Courier" charset="0"/>
+                <a:cs typeface="Courier" charset="0"/>
+              </a:rPr>
+              <a:t>return</a:t>
+            </a:r>
+            <a:r>
+              <a:rPr lang="en-US" sz="1200" dirty="0">
+                <a:latin typeface="Courier" charset="0"/>
+                <a:ea typeface="Courier" charset="0"/>
+                <a:cs typeface="Courier" charset="0"/>
+              </a:rPr>
+              <a:t> </a:t>
             </a:r>
             <a:r>
               <a:rPr lang="en-US" sz="1200" dirty="0" err="1">
@@ -23716,7 +23811,31 @@
                 <a:ea typeface="Courier" charset="0"/>
                 <a:cs typeface="Courier" charset="0"/>
               </a:rPr>
-              <a:t>check);</a:t>
+              <a:t>check</a:t>
+            </a:r>
+            <a:r>
+              <a:rPr lang="en-US" sz="1200" dirty="0" smtClean="0">
+                <a:latin typeface="Courier" charset="0"/>
+                <a:ea typeface="Courier" charset="0"/>
+                <a:cs typeface="Courier" charset="0"/>
+              </a:rPr>
+              <a:t>);</a:t>
+            </a:r>
+          </a:p>
+          <a:p>
+            <a:pPr marL="0" indent="0">
+              <a:lnSpc>
+                <a:spcPct val="100000"/>
+              </a:lnSpc>
+              <a:buNone/>
+            </a:pPr>
+            <a:r>
+              <a:rPr lang="en-US" sz="1200" dirty="0">
+                <a:latin typeface="Courier" charset="0"/>
+                <a:ea typeface="Courier" charset="0"/>
+                <a:cs typeface="Courier" charset="0"/>
+              </a:rPr>
+              <a:t>}</a:t>
             </a:r>
             <a:endParaRPr lang="en-US" sz="1200" dirty="0">
               <a:latin typeface="Courier" charset="0"/>
@@ -23934,10 +24053,10 @@
         </p:nvGrpSpPr>
         <p:grpSpPr>
           <a:xfrm>
-            <a:off x="1033481" y="4655999"/>
-            <a:ext cx="7953765" cy="1253298"/>
-            <a:chOff x="4947209" y="2058074"/>
-            <a:chExt cx="7953765" cy="1253298"/>
+            <a:off x="1033481" y="4865007"/>
+            <a:ext cx="7953765" cy="913660"/>
+            <a:chOff x="4947209" y="2267082"/>
+            <a:chExt cx="7953765" cy="913660"/>
           </a:xfrm>
         </p:grpSpPr>
         <p:sp>
@@ -23948,8 +24067,8 @@
           </p:nvSpPr>
           <p:spPr>
             <a:xfrm>
-              <a:off x="4947209" y="2058074"/>
-              <a:ext cx="7953765" cy="352696"/>
+              <a:off x="4947209" y="2267082"/>
+              <a:ext cx="7953765" cy="307885"/>
             </a:xfrm>
             <a:prstGeom prst="rect">
               <a:avLst/>
@@ -23998,7 +24117,7 @@
           </p:nvSpPr>
           <p:spPr>
             <a:xfrm>
-              <a:off x="4947209" y="3011662"/>
+              <a:off x="4947209" y="2881032"/>
               <a:ext cx="3198886" cy="299710"/>
             </a:xfrm>
             <a:prstGeom prst="rect">

</xml_diff>